<commit_message>
Update lecture 14 slides.
</commit_message>
<xml_diff>
--- a/bishops/cs321/resources/CS321_Lecture_14.pptx
+++ b/bishops/cs321/resources/CS321_Lecture_14.pptx
@@ -5,7 +5,7 @@
     <p:sldMasterId id="2147483648" r:id="rId1"/>
   </p:sldMasterIdLst>
   <p:notesMasterIdLst>
-    <p:notesMasterId r:id="rId39"/>
+    <p:notesMasterId r:id="rId38"/>
   </p:notesMasterIdLst>
   <p:sldIdLst>
     <p:sldId id="256" r:id="rId2"/>
@@ -40,11 +40,10 @@
     <p:sldId id="289" r:id="rId31"/>
     <p:sldId id="290" r:id="rId32"/>
     <p:sldId id="291" r:id="rId33"/>
-    <p:sldId id="296" r:id="rId34"/>
-    <p:sldId id="295" r:id="rId35"/>
-    <p:sldId id="292" r:id="rId36"/>
-    <p:sldId id="293" r:id="rId37"/>
-    <p:sldId id="294" r:id="rId38"/>
+    <p:sldId id="295" r:id="rId34"/>
+    <p:sldId id="292" r:id="rId35"/>
+    <p:sldId id="293" r:id="rId36"/>
+    <p:sldId id="294" r:id="rId37"/>
   </p:sldIdLst>
   <p:sldSz cx="12192000" cy="6858000"/>
   <p:notesSz cx="6858000" cy="9144000"/>
@@ -8912,29 +8911,107 @@
           </a:bodyPr>
           <a:lstStyle/>
           <a:p>
-            <a:pPr lvl="1"/>
-            <a:r>
-              <a:rPr lang="en-US" altLang="en-US" sz="2800" b="1" dirty="0"/>
-              <a:t>Composite - </a:t>
-            </a:r>
-            <a:r>
-              <a:rPr lang="en-US" altLang="en-US" sz="2800" dirty="0"/>
-              <a:t>Composes objects into tree structures to represent part-whole hierarchies. Lets clients treat individual objects and compositions of objects uniformly.</a:t>
-            </a:r>
-          </a:p>
-          <a:p>
-            <a:pPr lvl="1"/>
-            <a:endParaRPr lang="en-US" altLang="en-US" sz="2800" dirty="0"/>
-          </a:p>
-          <a:p>
-            <a:pPr lvl="1"/>
-            <a:r>
-              <a:rPr lang="en-US" altLang="en-US" sz="2800" b="1" dirty="0"/>
-              <a:t>Decorator - </a:t>
-            </a:r>
-            <a:r>
-              <a:rPr lang="en-US" altLang="en-US" sz="2800" dirty="0"/>
-              <a:t>Attaches additional responsibilities to an object dynamically. Provides a flexible alternative to subclassing for extending functionality.</a:t>
+            <a:pPr>
+              <a:lnSpc>
+                <a:spcPct val="90000"/>
+              </a:lnSpc>
+            </a:pPr>
+            <a:r>
+              <a:rPr lang="en-US" altLang="en-US" dirty="0"/>
+              <a:t>Things to think about:</a:t>
+            </a:r>
+          </a:p>
+          <a:p>
+            <a:pPr lvl="1">
+              <a:lnSpc>
+                <a:spcPct val="90000"/>
+              </a:lnSpc>
+            </a:pPr>
+            <a:r>
+              <a:rPr lang="en-US" altLang="en-US" dirty="0"/>
+              <a:t>Do you have favorite things you use in your design efforts?</a:t>
+            </a:r>
+          </a:p>
+          <a:p>
+            <a:pPr lvl="2">
+              <a:lnSpc>
+                <a:spcPct val="90000"/>
+              </a:lnSpc>
+            </a:pPr>
+            <a:r>
+              <a:rPr lang="en-US" altLang="en-US" dirty="0"/>
+              <a:t>algorithms</a:t>
+            </a:r>
+          </a:p>
+          <a:p>
+            <a:pPr lvl="2">
+              <a:lnSpc>
+                <a:spcPct val="90000"/>
+              </a:lnSpc>
+            </a:pPr>
+            <a:r>
+              <a:rPr lang="en-US" altLang="en-US" dirty="0"/>
+              <a:t>classes</a:t>
+            </a:r>
+          </a:p>
+          <a:p>
+            <a:pPr lvl="2">
+              <a:lnSpc>
+                <a:spcPct val="90000"/>
+              </a:lnSpc>
+            </a:pPr>
+            <a:r>
+              <a:rPr lang="en-US" altLang="en-US" dirty="0"/>
+              <a:t>patterns</a:t>
+            </a:r>
+          </a:p>
+          <a:p>
+            <a:pPr lvl="2">
+              <a:lnSpc>
+                <a:spcPct val="90000"/>
+              </a:lnSpc>
+            </a:pPr>
+            <a:r>
+              <a:rPr lang="en-US" altLang="en-US" dirty="0"/>
+              <a:t>tools</a:t>
+            </a:r>
+          </a:p>
+          <a:p>
+            <a:pPr lvl="2">
+              <a:lnSpc>
+                <a:spcPct val="90000"/>
+              </a:lnSpc>
+            </a:pPr>
+            <a:endParaRPr lang="en-US" altLang="en-US" dirty="0"/>
+          </a:p>
+          <a:p>
+            <a:pPr lvl="1">
+              <a:lnSpc>
+                <a:spcPct val="90000"/>
+              </a:lnSpc>
+            </a:pPr>
+            <a:r>
+              <a:rPr lang="en-US" altLang="en-US" dirty="0"/>
+              <a:t>How do you keep track of these things when you move to a new assignment/project or a new class and eventually to a new job?</a:t>
+            </a:r>
+          </a:p>
+          <a:p>
+            <a:pPr lvl="1">
+              <a:lnSpc>
+                <a:spcPct val="90000"/>
+              </a:lnSpc>
+            </a:pPr>
+            <a:endParaRPr lang="en-US" altLang="en-US" dirty="0"/>
+          </a:p>
+          <a:p>
+            <a:pPr lvl="1">
+              <a:lnSpc>
+                <a:spcPct val="90000"/>
+              </a:lnSpc>
+            </a:pPr>
+            <a:r>
+              <a:rPr lang="en-US" altLang="en-US" dirty="0"/>
+              <a:t>How would you share them or publish them ?</a:t>
             </a:r>
           </a:p>
         </p:txBody>
@@ -9013,7 +9090,7 @@
     </p:spTree>
     <p:extLst>
       <p:ext uri="{BB962C8B-B14F-4D97-AF65-F5344CB8AC3E}">
-        <p14:creationId xmlns:p14="http://schemas.microsoft.com/office/powerpoint/2010/main" val="4143783642"/>
+        <p14:creationId xmlns:p14="http://schemas.microsoft.com/office/powerpoint/2010/main" val="351910534"/>
       </p:ext>
     </p:extLst>
   </p:cSld>
@@ -9057,7 +9134,7 @@
           <a:p>
             <a:r>
               <a:rPr lang="en-US" altLang="en-US" dirty="0"/>
-              <a:t>Brief Description of each Pattern (cont.)</a:t>
+              <a:t>Format of Design Pattern Descriptions</a:t>
             </a:r>
             <a:endParaRPr lang="en-CA" dirty="0"/>
           </a:p>
@@ -9081,111 +9158,91 @@
         </p:spPr>
         <p:txBody>
           <a:bodyPr>
-            <a:normAutofit/>
+            <a:normAutofit fontScale="92500"/>
           </a:bodyPr>
           <a:lstStyle/>
           <a:p>
             <a:pPr>
               <a:lnSpc>
-                <a:spcPct val="90000"/>
+                <a:spcPct val="80000"/>
               </a:lnSpc>
             </a:pPr>
             <a:r>
-              <a:rPr lang="en-US" altLang="en-US" dirty="0"/>
-              <a:t>Things to think about:</a:t>
-            </a:r>
-          </a:p>
-          <a:p>
-            <a:pPr lvl="1">
+              <a:rPr lang="en-US" altLang="en-US" sz="2800" b="1" dirty="0"/>
+              <a:t>Pattern Name and Classification:</a:t>
+            </a:r>
+            <a:r>
+              <a:rPr lang="en-US" altLang="en-US" sz="2800" dirty="0"/>
+              <a:t> Every pattern should have a descriptive and unique name that helps in identifying and referring to it. This classification helps in identifying the use of the pattern. </a:t>
+            </a:r>
+          </a:p>
+          <a:p>
+            <a:pPr>
               <a:lnSpc>
-                <a:spcPct val="90000"/>
+                <a:spcPct val="80000"/>
               </a:lnSpc>
             </a:pPr>
-            <a:r>
-              <a:rPr lang="en-US" altLang="en-US" dirty="0"/>
-              <a:t>Do you have favorite things you use in your design efforts?</a:t>
-            </a:r>
-          </a:p>
-          <a:p>
-            <a:pPr lvl="2">
+            <a:endParaRPr lang="en-US" altLang="en-US" sz="2800" b="1" dirty="0"/>
+          </a:p>
+          <a:p>
+            <a:pPr>
               <a:lnSpc>
-                <a:spcPct val="90000"/>
+                <a:spcPct val="80000"/>
               </a:lnSpc>
             </a:pPr>
             <a:r>
-              <a:rPr lang="en-US" altLang="en-US" dirty="0"/>
-              <a:t>algorithms</a:t>
-            </a:r>
-          </a:p>
-          <a:p>
-            <a:pPr lvl="2">
+              <a:rPr lang="en-US" altLang="en-US" sz="2800" b="1" dirty="0"/>
+              <a:t>Intent:</a:t>
+            </a:r>
+            <a:r>
+              <a:rPr lang="en-US" altLang="en-US" sz="2800" dirty="0"/>
+              <a:t> This section should describe the goal behind the pattern and the reason for using it. It resembles the problem part of the pattern. </a:t>
+            </a:r>
+          </a:p>
+          <a:p>
+            <a:pPr>
               <a:lnSpc>
-                <a:spcPct val="90000"/>
+                <a:spcPct val="80000"/>
               </a:lnSpc>
             </a:pPr>
-            <a:r>
-              <a:rPr lang="en-US" altLang="en-US" dirty="0"/>
-              <a:t>classes</a:t>
-            </a:r>
-          </a:p>
-          <a:p>
-            <a:pPr lvl="2">
+            <a:endParaRPr lang="en-US" altLang="en-US" sz="2800" b="1" dirty="0"/>
+          </a:p>
+          <a:p>
+            <a:pPr>
               <a:lnSpc>
-                <a:spcPct val="90000"/>
+                <a:spcPct val="80000"/>
               </a:lnSpc>
             </a:pPr>
             <a:r>
-              <a:rPr lang="en-US" altLang="en-US" dirty="0"/>
-              <a:t>patterns</a:t>
-            </a:r>
-          </a:p>
-          <a:p>
-            <a:pPr lvl="2">
+              <a:rPr lang="en-US" altLang="en-US" sz="2800" b="1" dirty="0"/>
+              <a:t>Also Known As:</a:t>
+            </a:r>
+            <a:r>
+              <a:rPr lang="en-US" altLang="en-US" sz="2800" dirty="0"/>
+              <a:t> A pattern could have more than one name. These names should be documented in this section. </a:t>
+            </a:r>
+          </a:p>
+          <a:p>
+            <a:pPr>
               <a:lnSpc>
-                <a:spcPct val="90000"/>
+                <a:spcPct val="80000"/>
               </a:lnSpc>
             </a:pPr>
-            <a:r>
-              <a:rPr lang="en-US" altLang="en-US" dirty="0"/>
-              <a:t>tools</a:t>
-            </a:r>
-          </a:p>
-          <a:p>
-            <a:pPr lvl="2">
+            <a:endParaRPr lang="en-US" altLang="en-US" sz="2800" b="1" dirty="0"/>
+          </a:p>
+          <a:p>
+            <a:pPr>
               <a:lnSpc>
-                <a:spcPct val="90000"/>
+                <a:spcPct val="80000"/>
               </a:lnSpc>
             </a:pPr>
-            <a:endParaRPr lang="en-US" altLang="en-US" dirty="0"/>
-          </a:p>
-          <a:p>
-            <a:pPr lvl="1">
-              <a:lnSpc>
-                <a:spcPct val="90000"/>
-              </a:lnSpc>
-            </a:pPr>
-            <a:r>
-              <a:rPr lang="en-US" altLang="en-US" dirty="0"/>
-              <a:t>How do you keep track of these things when you move to a new assignment/project or a new class and eventually to a new job?</a:t>
-            </a:r>
-          </a:p>
-          <a:p>
-            <a:pPr lvl="1">
-              <a:lnSpc>
-                <a:spcPct val="90000"/>
-              </a:lnSpc>
-            </a:pPr>
-            <a:endParaRPr lang="en-US" altLang="en-US" dirty="0"/>
-          </a:p>
-          <a:p>
-            <a:pPr lvl="1">
-              <a:lnSpc>
-                <a:spcPct val="90000"/>
-              </a:lnSpc>
-            </a:pPr>
-            <a:r>
-              <a:rPr lang="en-US" altLang="en-US" dirty="0"/>
-              <a:t>How would you share them or publish them ?</a:t>
+            <a:r>
+              <a:rPr lang="en-US" altLang="en-US" sz="2800" b="1" dirty="0"/>
+              <a:t>Motivation(Forces):</a:t>
+            </a:r>
+            <a:r>
+              <a:rPr lang="en-US" altLang="en-US" sz="2800" dirty="0"/>
+              <a:t> This section provides a scenario consisting of a problem and a context in which this pattern can be used. By relating the problem and the context, this section shows when this pattern is used. </a:t>
             </a:r>
           </a:p>
         </p:txBody>
@@ -9264,7 +9321,7 @@
     </p:spTree>
     <p:extLst>
       <p:ext uri="{BB962C8B-B14F-4D97-AF65-F5344CB8AC3E}">
-        <p14:creationId xmlns:p14="http://schemas.microsoft.com/office/powerpoint/2010/main" val="351910534"/>
+        <p14:creationId xmlns:p14="http://schemas.microsoft.com/office/powerpoint/2010/main" val="149226633"/>
       </p:ext>
     </p:extLst>
   </p:cSld>
@@ -9332,7 +9389,7 @@
         </p:spPr>
         <p:txBody>
           <a:bodyPr>
-            <a:normAutofit fontScale="92500"/>
+            <a:normAutofit fontScale="92500" lnSpcReduction="10000"/>
           </a:bodyPr>
           <a:lstStyle/>
           <a:p>
@@ -9343,11 +9400,61 @@
             </a:pPr>
             <a:r>
               <a:rPr lang="en-US" altLang="en-US" sz="2800" b="1" dirty="0"/>
-              <a:t>Pattern Name and Classification:</a:t>
+              <a:t>Applicability:</a:t>
             </a:r>
             <a:r>
               <a:rPr lang="en-US" altLang="en-US" sz="2800" dirty="0"/>
-              <a:t> Every pattern should have a descriptive and unique name that helps in identifying and referring to it. This classification helps in identifying the use of the pattern. </a:t>
+              <a:t> This section includes situations in which this pattern is usable. It represents the </a:t>
+            </a:r>
+            <a:r>
+              <a:rPr lang="en-US" altLang="en-US" sz="2800" u="sng" dirty="0"/>
+              <a:t>context</a:t>
+            </a:r>
+            <a:r>
+              <a:rPr lang="en-US" altLang="en-US" sz="2800" dirty="0"/>
+              <a:t> part of the pattern.</a:t>
+            </a:r>
+          </a:p>
+          <a:p>
+            <a:pPr>
+              <a:lnSpc>
+                <a:spcPct val="80000"/>
+              </a:lnSpc>
+            </a:pPr>
+            <a:r>
+              <a:rPr lang="en-US" altLang="en-US" sz="2800" dirty="0"/>
+              <a:t> </a:t>
+            </a:r>
+          </a:p>
+          <a:p>
+            <a:pPr>
+              <a:lnSpc>
+                <a:spcPct val="80000"/>
+              </a:lnSpc>
+            </a:pPr>
+            <a:r>
+              <a:rPr lang="en-US" altLang="en-US" sz="2800" b="1" dirty="0"/>
+              <a:t>Structure:</a:t>
+            </a:r>
+            <a:r>
+              <a:rPr lang="en-US" altLang="en-US" sz="2800" dirty="0"/>
+              <a:t> A graphical representation of the pattern. </a:t>
+            </a:r>
+            <a:r>
+              <a:rPr lang="en-US" altLang="en-US" sz="2800" u="sng" dirty="0"/>
+              <a:t>Class diagrams</a:t>
+            </a:r>
+            <a:r>
+              <a:rPr lang="en-US" altLang="en-US" sz="2800" dirty="0"/>
+              <a:t> and </a:t>
+            </a:r>
+            <a:r>
+              <a:rPr lang="en-US" altLang="en-US" sz="2800" u="sng" dirty="0"/>
+              <a:t>Interaction diagrams</a:t>
+            </a:r>
+            <a:r>
+              <a:rPr lang="en-US" altLang="en-US" sz="2800" dirty="0"/>
+              <a:t> can be used for this purpose. </a:t>
             </a:r>
           </a:p>
           <a:p>
@@ -9366,11 +9473,11 @@
             </a:pPr>
             <a:r>
               <a:rPr lang="en-US" altLang="en-US" sz="2800" b="1" dirty="0"/>
-              <a:t>Intent:</a:t>
+              <a:t>Participants:</a:t>
             </a:r>
             <a:r>
               <a:rPr lang="en-US" altLang="en-US" sz="2800" dirty="0"/>
-              <a:t> This section should describe the goal behind the pattern and the reason for using it. It resembles the problem part of the pattern. </a:t>
+              <a:t> A listing of the classes and objects used in this pattern and their roles in the design. </a:t>
             </a:r>
           </a:p>
           <a:p>
@@ -9389,11 +9496,11 @@
             </a:pPr>
             <a:r>
               <a:rPr lang="en-US" altLang="en-US" sz="2800" b="1" dirty="0"/>
-              <a:t>Also Known As:</a:t>
+              <a:t>Collaboration:</a:t>
             </a:r>
             <a:r>
               <a:rPr lang="en-US" altLang="en-US" sz="2800" dirty="0"/>
-              <a:t> A pattern could have more than one name. These names should be documented in this section. </a:t>
+              <a:t> Describes how classes and objects used in the pattern interact with each other. </a:t>
             </a:r>
           </a:p>
           <a:p>
@@ -9412,11 +9519,19 @@
             </a:pPr>
             <a:r>
               <a:rPr lang="en-US" altLang="en-US" sz="2800" b="1" dirty="0"/>
-              <a:t>Motivation(Forces):</a:t>
+              <a:t>Consequences (</a:t>
             </a:r>
             <a:r>
               <a:rPr lang="en-US" altLang="en-US" sz="2800" dirty="0"/>
-              <a:t> This section provides a scenario consisting of a problem and a context in which this pattern can be used. By relating the problem and the context, this section shows when this pattern is used. </a:t>
+              <a:t>of this choice of solution</a:t>
+            </a:r>
+            <a:r>
+              <a:rPr lang="en-US" altLang="en-US" sz="2800" b="1" dirty="0"/>
+              <a:t>):</a:t>
+            </a:r>
+            <a:r>
+              <a:rPr lang="en-US" altLang="en-US" sz="2800" dirty="0"/>
+              <a:t> This section describes the results, side effects, and trade offs caused by using this pattern. </a:t>
             </a:r>
           </a:p>
         </p:txBody>
@@ -9495,7 +9610,7 @@
     </p:spTree>
     <p:extLst>
       <p:ext uri="{BB962C8B-B14F-4D97-AF65-F5344CB8AC3E}">
-        <p14:creationId xmlns:p14="http://schemas.microsoft.com/office/powerpoint/2010/main" val="149226633"/>
+        <p14:creationId xmlns:p14="http://schemas.microsoft.com/office/powerpoint/2010/main" val="592769764"/>
       </p:ext>
     </p:extLst>
   </p:cSld>
@@ -9574,295 +9689,6 @@
             </a:pPr>
             <a:r>
               <a:rPr lang="en-US" altLang="en-US" sz="2800" b="1" dirty="0"/>
-              <a:t>Applicability:</a:t>
-            </a:r>
-            <a:r>
-              <a:rPr lang="en-US" altLang="en-US" sz="2800" dirty="0"/>
-              <a:t> This section includes situations in which this pattern is usable. It represents the </a:t>
-            </a:r>
-            <a:r>
-              <a:rPr lang="en-US" altLang="en-US" sz="2800" u="sng" dirty="0"/>
-              <a:t>context</a:t>
-            </a:r>
-            <a:r>
-              <a:rPr lang="en-US" altLang="en-US" sz="2800" dirty="0"/>
-              <a:t> part of the pattern.</a:t>
-            </a:r>
-          </a:p>
-          <a:p>
-            <a:pPr>
-              <a:lnSpc>
-                <a:spcPct val="80000"/>
-              </a:lnSpc>
-            </a:pPr>
-            <a:r>
-              <a:rPr lang="en-US" altLang="en-US" sz="2800" dirty="0"/>
-              <a:t> </a:t>
-            </a:r>
-          </a:p>
-          <a:p>
-            <a:pPr>
-              <a:lnSpc>
-                <a:spcPct val="80000"/>
-              </a:lnSpc>
-            </a:pPr>
-            <a:r>
-              <a:rPr lang="en-US" altLang="en-US" sz="2800" b="1" dirty="0"/>
-              <a:t>Structure:</a:t>
-            </a:r>
-            <a:r>
-              <a:rPr lang="en-US" altLang="en-US" sz="2800" dirty="0"/>
-              <a:t> A graphical representation of the pattern. </a:t>
-            </a:r>
-            <a:r>
-              <a:rPr lang="en-US" altLang="en-US" sz="2800" u="sng" dirty="0"/>
-              <a:t>Class diagrams</a:t>
-            </a:r>
-            <a:r>
-              <a:rPr lang="en-US" altLang="en-US" sz="2800" dirty="0"/>
-              <a:t> and </a:t>
-            </a:r>
-            <a:r>
-              <a:rPr lang="en-US" altLang="en-US" sz="2800" u="sng" dirty="0"/>
-              <a:t>Interaction diagrams</a:t>
-            </a:r>
-            <a:r>
-              <a:rPr lang="en-US" altLang="en-US" sz="2800" dirty="0"/>
-              <a:t> can be used for this purpose. </a:t>
-            </a:r>
-          </a:p>
-          <a:p>
-            <a:pPr>
-              <a:lnSpc>
-                <a:spcPct val="80000"/>
-              </a:lnSpc>
-            </a:pPr>
-            <a:endParaRPr lang="en-US" altLang="en-US" sz="2800" b="1" dirty="0"/>
-          </a:p>
-          <a:p>
-            <a:pPr>
-              <a:lnSpc>
-                <a:spcPct val="80000"/>
-              </a:lnSpc>
-            </a:pPr>
-            <a:r>
-              <a:rPr lang="en-US" altLang="en-US" sz="2800" b="1" dirty="0"/>
-              <a:t>Participants:</a:t>
-            </a:r>
-            <a:r>
-              <a:rPr lang="en-US" altLang="en-US" sz="2800" dirty="0"/>
-              <a:t> A listing of the classes and objects used in this pattern and their roles in the design. </a:t>
-            </a:r>
-          </a:p>
-          <a:p>
-            <a:pPr>
-              <a:lnSpc>
-                <a:spcPct val="80000"/>
-              </a:lnSpc>
-            </a:pPr>
-            <a:endParaRPr lang="en-US" altLang="en-US" sz="2800" b="1" dirty="0"/>
-          </a:p>
-          <a:p>
-            <a:pPr>
-              <a:lnSpc>
-                <a:spcPct val="80000"/>
-              </a:lnSpc>
-            </a:pPr>
-            <a:r>
-              <a:rPr lang="en-US" altLang="en-US" sz="2800" b="1" dirty="0"/>
-              <a:t>Collaboration:</a:t>
-            </a:r>
-            <a:r>
-              <a:rPr lang="en-US" altLang="en-US" sz="2800" dirty="0"/>
-              <a:t> Describes how classes and objects used in the pattern interact with each other. </a:t>
-            </a:r>
-          </a:p>
-          <a:p>
-            <a:pPr>
-              <a:lnSpc>
-                <a:spcPct val="80000"/>
-              </a:lnSpc>
-            </a:pPr>
-            <a:endParaRPr lang="en-US" altLang="en-US" sz="2800" b="1" dirty="0"/>
-          </a:p>
-          <a:p>
-            <a:pPr>
-              <a:lnSpc>
-                <a:spcPct val="80000"/>
-              </a:lnSpc>
-            </a:pPr>
-            <a:r>
-              <a:rPr lang="en-US" altLang="en-US" sz="2800" b="1" dirty="0"/>
-              <a:t>Consequences (</a:t>
-            </a:r>
-            <a:r>
-              <a:rPr lang="en-US" altLang="en-US" sz="2800" dirty="0"/>
-              <a:t>of this choice of solution</a:t>
-            </a:r>
-            <a:r>
-              <a:rPr lang="en-US" altLang="en-US" sz="2800" b="1" dirty="0"/>
-              <a:t>):</a:t>
-            </a:r>
-            <a:r>
-              <a:rPr lang="en-US" altLang="en-US" sz="2800" dirty="0"/>
-              <a:t> This section describes the results, side effects, and trade offs caused by using this pattern. </a:t>
-            </a:r>
-          </a:p>
-        </p:txBody>
-      </p:sp>
-      <p:sp>
-        <p:nvSpPr>
-          <p:cNvPr id="6" name="Date Placeholder 5"/>
-          <p:cNvSpPr>
-            <a:spLocks noGrp="1"/>
-          </p:cNvSpPr>
-          <p:nvPr>
-            <p:ph type="dt" sz="half" idx="2"/>
-          </p:nvPr>
-        </p:nvSpPr>
-        <p:spPr/>
-        <p:txBody>
-          <a:bodyPr/>
-          <a:lstStyle/>
-          <a:p>
-            <a:r>
-              <a:rPr lang="en-CA" dirty="0"/>
-              <a:t>Winter 2022</a:t>
-            </a:r>
-          </a:p>
-        </p:txBody>
-      </p:sp>
-      <p:sp>
-        <p:nvSpPr>
-          <p:cNvPr id="10" name="Footer Placeholder 9"/>
-          <p:cNvSpPr>
-            <a:spLocks noGrp="1"/>
-          </p:cNvSpPr>
-          <p:nvPr>
-            <p:ph type="ftr" sz="quarter" idx="3"/>
-          </p:nvPr>
-        </p:nvSpPr>
-        <p:spPr/>
-        <p:txBody>
-          <a:bodyPr/>
-          <a:lstStyle/>
-          <a:p>
-            <a:r>
-              <a:rPr lang="en-CA" dirty="0"/>
-              <a:t>CS321: Advanced Programming Techniques</a:t>
-            </a:r>
-          </a:p>
-        </p:txBody>
-      </p:sp>
-      <p:sp>
-        <p:nvSpPr>
-          <p:cNvPr id="12" name="Slide Number Placeholder 11"/>
-          <p:cNvSpPr>
-            <a:spLocks noGrp="1"/>
-          </p:cNvSpPr>
-          <p:nvPr>
-            <p:ph type="sldNum" sz="quarter" idx="4"/>
-          </p:nvPr>
-        </p:nvSpPr>
-        <p:spPr/>
-        <p:txBody>
-          <a:bodyPr/>
-          <a:lstStyle/>
-          <a:p>
-            <a:fld id="{5174927E-2439-42C0-9720-7BBCA09BF46F}" type="slidenum">
-              <a:rPr lang="en-CA" smtClean="0"/>
-              <a:pPr/>
-              <a:t>36</a:t>
-            </a:fld>
-            <a:r>
-              <a:rPr lang="en-CA" dirty="0"/>
-              <a:t> </a:t>
-            </a:r>
-          </a:p>
-        </p:txBody>
-      </p:sp>
-    </p:spTree>
-    <p:extLst>
-      <p:ext uri="{BB962C8B-B14F-4D97-AF65-F5344CB8AC3E}">
-        <p14:creationId xmlns:p14="http://schemas.microsoft.com/office/powerpoint/2010/main" val="592769764"/>
-      </p:ext>
-    </p:extLst>
-  </p:cSld>
-  <p:clrMapOvr>
-    <a:masterClrMapping/>
-  </p:clrMapOvr>
-</p:sld>
-</file>
-
-<file path=ppt/slides/slide37.xml><?xml version="1.0" encoding="utf-8"?>
-<p:sld xmlns:a="http://schemas.openxmlformats.org/drawingml/2006/main" xmlns:r="http://schemas.openxmlformats.org/officeDocument/2006/relationships" xmlns:p="http://schemas.openxmlformats.org/presentationml/2006/main">
-  <p:cSld>
-    <p:spTree>
-      <p:nvGrpSpPr>
-        <p:cNvPr id="1" name=""/>
-        <p:cNvGrpSpPr/>
-        <p:nvPr/>
-      </p:nvGrpSpPr>
-      <p:grpSpPr>
-        <a:xfrm>
-          <a:off x="0" y="0"/>
-          <a:ext cx="0" cy="0"/>
-          <a:chOff x="0" y="0"/>
-          <a:chExt cx="0" cy="0"/>
-        </a:xfrm>
-      </p:grpSpPr>
-      <p:sp>
-        <p:nvSpPr>
-          <p:cNvPr id="2" name="Title 1"/>
-          <p:cNvSpPr>
-            <a:spLocks noGrp="1"/>
-          </p:cNvSpPr>
-          <p:nvPr>
-            <p:ph type="title"/>
-          </p:nvPr>
-        </p:nvSpPr>
-        <p:spPr/>
-        <p:txBody>
-          <a:bodyPr/>
-          <a:lstStyle/>
-          <a:p>
-            <a:r>
-              <a:rPr lang="en-US" altLang="en-US" dirty="0"/>
-              <a:t>Format of Design Pattern Descriptions</a:t>
-            </a:r>
-            <a:endParaRPr lang="en-CA" dirty="0"/>
-          </a:p>
-        </p:txBody>
-      </p:sp>
-      <p:sp>
-        <p:nvSpPr>
-          <p:cNvPr id="3" name="Content Placeholder 2"/>
-          <p:cNvSpPr>
-            <a:spLocks noGrp="1"/>
-          </p:cNvSpPr>
-          <p:nvPr>
-            <p:ph idx="1"/>
-          </p:nvPr>
-        </p:nvSpPr>
-        <p:spPr>
-          <a:xfrm>
-            <a:off x="640874" y="1168401"/>
-            <a:ext cx="10515600" cy="5025922"/>
-          </a:xfrm>
-        </p:spPr>
-        <p:txBody>
-          <a:bodyPr>
-            <a:normAutofit fontScale="92500" lnSpcReduction="10000"/>
-          </a:bodyPr>
-          <a:lstStyle/>
-          <a:p>
-            <a:pPr>
-              <a:lnSpc>
-                <a:spcPct val="80000"/>
-              </a:lnSpc>
-            </a:pPr>
-            <a:r>
-              <a:rPr lang="en-US" altLang="en-US" sz="2800" b="1" dirty="0"/>
               <a:t>Implementation:</a:t>
             </a:r>
             <a:r>
@@ -10003,7 +9829,7 @@
             <a:fld id="{5174927E-2439-42C0-9720-7BBCA09BF46F}" type="slidenum">
               <a:rPr lang="en-CA" smtClean="0"/>
               <a:pPr/>
-              <a:t>37</a:t>
+              <a:t>36</a:t>
             </a:fld>
             <a:r>
               <a:rPr lang="en-CA" dirty="0"/>

</xml_diff>